<commit_message>
this is the mid term review!
</commit_message>
<xml_diff>
--- a/document/pipeline.pptx
+++ b/document/pipeline.pptx
@@ -104,6 +104,11 @@
       </a:defRPr>
     </a:lvl9pPr>
   </p:defaultTextStyle>
+  <p:extLst>
+    <p:ext uri="{EFAFB233-063F-42B5-8137-9DF3F51BA10A}">
+      <p15:sldGuideLst xmlns:p15="http://schemas.microsoft.com/office/powerpoint/2012/main"/>
+    </p:ext>
+  </p:extLst>
 </p:presentation>
 </file>
 
@@ -238,7 +243,7 @@
           <a:p>
             <a:fld id="{84948842-38D2-4AEA-A03B-8C01A6CF6734}" type="datetimeFigureOut">
               <a:rPr lang="zh-CN" altLang="en-US" smtClean="0"/>
-              <a:t>2018/4/25</a:t>
+              <a:t>2018/5/6</a:t>
             </a:fld>
             <a:endParaRPr lang="zh-CN" altLang="en-US"/>
           </a:p>
@@ -408,7 +413,7 @@
           <a:p>
             <a:fld id="{84948842-38D2-4AEA-A03B-8C01A6CF6734}" type="datetimeFigureOut">
               <a:rPr lang="zh-CN" altLang="en-US" smtClean="0"/>
-              <a:t>2018/4/25</a:t>
+              <a:t>2018/5/6</a:t>
             </a:fld>
             <a:endParaRPr lang="zh-CN" altLang="en-US"/>
           </a:p>
@@ -588,7 +593,7 @@
           <a:p>
             <a:fld id="{84948842-38D2-4AEA-A03B-8C01A6CF6734}" type="datetimeFigureOut">
               <a:rPr lang="zh-CN" altLang="en-US" smtClean="0"/>
-              <a:t>2018/4/25</a:t>
+              <a:t>2018/5/6</a:t>
             </a:fld>
             <a:endParaRPr lang="zh-CN" altLang="en-US"/>
           </a:p>
@@ -758,7 +763,7 @@
           <a:p>
             <a:fld id="{84948842-38D2-4AEA-A03B-8C01A6CF6734}" type="datetimeFigureOut">
               <a:rPr lang="zh-CN" altLang="en-US" smtClean="0"/>
-              <a:t>2018/4/25</a:t>
+              <a:t>2018/5/6</a:t>
             </a:fld>
             <a:endParaRPr lang="zh-CN" altLang="en-US"/>
           </a:p>
@@ -1004,7 +1009,7 @@
           <a:p>
             <a:fld id="{84948842-38D2-4AEA-A03B-8C01A6CF6734}" type="datetimeFigureOut">
               <a:rPr lang="zh-CN" altLang="en-US" smtClean="0"/>
-              <a:t>2018/4/25</a:t>
+              <a:t>2018/5/6</a:t>
             </a:fld>
             <a:endParaRPr lang="zh-CN" altLang="en-US"/>
           </a:p>
@@ -1236,7 +1241,7 @@
           <a:p>
             <a:fld id="{84948842-38D2-4AEA-A03B-8C01A6CF6734}" type="datetimeFigureOut">
               <a:rPr lang="zh-CN" altLang="en-US" smtClean="0"/>
-              <a:t>2018/4/25</a:t>
+              <a:t>2018/5/6</a:t>
             </a:fld>
             <a:endParaRPr lang="zh-CN" altLang="en-US"/>
           </a:p>
@@ -1603,7 +1608,7 @@
           <a:p>
             <a:fld id="{84948842-38D2-4AEA-A03B-8C01A6CF6734}" type="datetimeFigureOut">
               <a:rPr lang="zh-CN" altLang="en-US" smtClean="0"/>
-              <a:t>2018/4/25</a:t>
+              <a:t>2018/5/6</a:t>
             </a:fld>
             <a:endParaRPr lang="zh-CN" altLang="en-US"/>
           </a:p>
@@ -1721,7 +1726,7 @@
           <a:p>
             <a:fld id="{84948842-38D2-4AEA-A03B-8C01A6CF6734}" type="datetimeFigureOut">
               <a:rPr lang="zh-CN" altLang="en-US" smtClean="0"/>
-              <a:t>2018/4/25</a:t>
+              <a:t>2018/5/6</a:t>
             </a:fld>
             <a:endParaRPr lang="zh-CN" altLang="en-US"/>
           </a:p>
@@ -1816,7 +1821,7 @@
           <a:p>
             <a:fld id="{84948842-38D2-4AEA-A03B-8C01A6CF6734}" type="datetimeFigureOut">
               <a:rPr lang="zh-CN" altLang="en-US" smtClean="0"/>
-              <a:t>2018/4/25</a:t>
+              <a:t>2018/5/6</a:t>
             </a:fld>
             <a:endParaRPr lang="zh-CN" altLang="en-US"/>
           </a:p>
@@ -2093,7 +2098,7 @@
           <a:p>
             <a:fld id="{84948842-38D2-4AEA-A03B-8C01A6CF6734}" type="datetimeFigureOut">
               <a:rPr lang="zh-CN" altLang="en-US" smtClean="0"/>
-              <a:t>2018/4/25</a:t>
+              <a:t>2018/5/6</a:t>
             </a:fld>
             <a:endParaRPr lang="zh-CN" altLang="en-US"/>
           </a:p>
@@ -2346,7 +2351,7 @@
           <a:p>
             <a:fld id="{84948842-38D2-4AEA-A03B-8C01A6CF6734}" type="datetimeFigureOut">
               <a:rPr lang="zh-CN" altLang="en-US" smtClean="0"/>
-              <a:t>2018/4/25</a:t>
+              <a:t>2018/5/6</a:t>
             </a:fld>
             <a:endParaRPr lang="zh-CN" altLang="en-US"/>
           </a:p>
@@ -2559,7 +2564,7 @@
           <a:p>
             <a:fld id="{84948842-38D2-4AEA-A03B-8C01A6CF6734}" type="datetimeFigureOut">
               <a:rPr lang="zh-CN" altLang="en-US" smtClean="0"/>
-              <a:t>2018/4/25</a:t>
+              <a:t>2018/5/6</a:t>
             </a:fld>
             <a:endParaRPr lang="zh-CN" altLang="en-US"/>
           </a:p>
@@ -4555,8 +4560,8 @@
             </a:p>
           </p:txBody>
         </p:sp>
-        <mc:AlternateContent xmlns:mc="http://schemas.openxmlformats.org/markup-compatibility/2006">
-          <mc:Choice xmlns:a14="http://schemas.microsoft.com/office/drawing/2010/main" Requires="a14">
+        <mc:AlternateContent xmlns:mc="http://schemas.openxmlformats.org/markup-compatibility/2006" xmlns:a14="http://schemas.microsoft.com/office/drawing/2010/main">
+          <mc:Choice Requires="a14">
             <p:sp>
               <p:nvSpPr>
                 <p:cNvPr id="64" name="文本框 63"/>
@@ -4592,6 +4597,7 @@
                 </a:bodyPr>
                 <a:lstStyle/>
                 <a:p>
+                  <a:pPr/>
                   <a14:m>
                     <m:oMathPara xmlns:m="http://schemas.openxmlformats.org/officeDocument/2006/math">
                       <m:oMathParaPr>
@@ -4642,7 +4648,7 @@
               </p:txBody>
             </p:sp>
           </mc:Choice>
-          <mc:Fallback>
+          <mc:Fallback xmlns="">
             <p:sp>
               <p:nvSpPr>
                 <p:cNvPr id="64" name="文本框 63"/>

</xml_diff>